<commit_message>
Updated metadata for "04. Loops Basics"
</commit_message>
<xml_diff>
--- a/Courses/Software-Sciences/Module-1-OOP-New/04-Loops-Basics/04-Loops-Basics.pptx
+++ b/Courses/Software-Sciences/Module-1-OOP-New/04-Loops-Basics/04-Loops-Basics.pptx
@@ -337,7 +337,7 @@
           <a:p>
             <a:fld id="{4E087215-0C8F-4762-A664-737A353EC9A4}" type="datetimeFigureOut">
               <a:rPr lang="bg-BG" smtClean="0"/>
-              <a:t>2.01.23 г.</a:t>
+              <a:t>18.01.23 г.</a:t>
             </a:fld>
             <a:endParaRPr lang="bg-BG"/>
           </a:p>
@@ -528,7 +528,7 @@
           <a:p>
             <a:fld id="{72D84649-876A-46C9-8472-14CB09C070D8}" type="datetimeFigureOut">
               <a:rPr lang="en-US" smtClean="0"/>
-              <a:t>1/2/23</a:t>
+              <a:t>1/18/23</a:t>
             </a:fld>
             <a:endParaRPr lang="en-US"/>
           </a:p>

</xml_diff>

<commit_message>
Updated exercises for "04. Loops - Basics"
</commit_message>
<xml_diff>
--- a/Courses/Software-Sciences/Module-1-OOP-New/04-Loops-Basics/04-Loops-Basics.pptx
+++ b/Courses/Software-Sciences/Module-1-OOP-New/04-Loops-Basics/04-Loops-Basics.pptx
@@ -5,10 +5,10 @@
     <p:sldMasterId id="2147483675" r:id="rId1"/>
   </p:sldMasterIdLst>
   <p:notesMasterIdLst>
-    <p:notesMasterId r:id="rId40"/>
+    <p:notesMasterId r:id="rId38"/>
   </p:notesMasterIdLst>
   <p:handoutMasterIdLst>
-    <p:handoutMasterId r:id="rId41"/>
+    <p:handoutMasterId r:id="rId39"/>
   </p:handoutMasterIdLst>
   <p:sldIdLst>
     <p:sldId id="274" r:id="rId2"/>
@@ -37,18 +37,16 @@
     <p:sldId id="645" r:id="rId25"/>
     <p:sldId id="649" r:id="rId26"/>
     <p:sldId id="650" r:id="rId27"/>
-    <p:sldId id="651" r:id="rId28"/>
-    <p:sldId id="652" r:id="rId29"/>
-    <p:sldId id="674" r:id="rId30"/>
-    <p:sldId id="675" r:id="rId31"/>
-    <p:sldId id="677" r:id="rId32"/>
-    <p:sldId id="678" r:id="rId33"/>
-    <p:sldId id="679" r:id="rId34"/>
-    <p:sldId id="680" r:id="rId35"/>
-    <p:sldId id="580" r:id="rId36"/>
-    <p:sldId id="504" r:id="rId37"/>
-    <p:sldId id="505" r:id="rId38"/>
-    <p:sldId id="506" r:id="rId39"/>
+    <p:sldId id="674" r:id="rId28"/>
+    <p:sldId id="675" r:id="rId29"/>
+    <p:sldId id="677" r:id="rId30"/>
+    <p:sldId id="678" r:id="rId31"/>
+    <p:sldId id="679" r:id="rId32"/>
+    <p:sldId id="680" r:id="rId33"/>
+    <p:sldId id="580" r:id="rId34"/>
+    <p:sldId id="504" r:id="rId35"/>
+    <p:sldId id="505" r:id="rId36"/>
+    <p:sldId id="506" r:id="rId37"/>
   </p:sldIdLst>
   <p:sldSz cx="12192000" cy="6858000"/>
   <p:notesSz cx="6858000" cy="9144000"/>
@@ -194,8 +192,6 @@
             <p14:sldId id="645"/>
             <p14:sldId id="649"/>
             <p14:sldId id="650"/>
-            <p14:sldId id="651"/>
-            <p14:sldId id="652"/>
           </p14:sldIdLst>
         </p14:section>
         <p14:section name="Вложени цикли" id="{6CFFCDD4-51EB-423D-8D1A-C00B34833F20}">
@@ -1118,7 +1114,7 @@
             <a:fld id="{3EBA5BD7-F043-4D1B-AA17-CD412FC534DE}" type="slidenum">
               <a:rPr lang="en-US" smtClean="0"/>
               <a:pPr/>
-              <a:t>37</a:t>
+              <a:t>35</a:t>
             </a:fld>
             <a:endParaRPr lang="en-US" dirty="0"/>
           </a:p>
@@ -1359,7 +1355,7 @@
             <a:fld id="{3EBA5BD7-F043-4D1B-AA17-CD412FC534DE}" type="slidenum">
               <a:rPr lang="en-US" smtClean="0"/>
               <a:pPr/>
-              <a:t>38</a:t>
+              <a:t>36</a:t>
             </a:fld>
             <a:endParaRPr lang="en-US" dirty="0"/>
           </a:p>
@@ -2288,7 +2284,7 @@
             <a:fld id="{3EBA5BD7-F043-4D1B-AA17-CD412FC534DE}" type="slidenum">
               <a:rPr lang="en-US" smtClean="0"/>
               <a:pPr/>
-              <a:t>35</a:t>
+              <a:t>33</a:t>
             </a:fld>
             <a:endParaRPr lang="en-US" dirty="0"/>
           </a:p>
@@ -2529,7 +2525,7 @@
             <a:fld id="{3EBA5BD7-F043-4D1B-AA17-CD412FC534DE}" type="slidenum">
               <a:rPr lang="en-US" smtClean="0"/>
               <a:pPr/>
-              <a:t>36</a:t>
+              <a:t>34</a:t>
             </a:fld>
             <a:endParaRPr lang="en-US" dirty="0"/>
           </a:p>
@@ -24089,1739 +24085,6 @@
           <a:chExt cx="0" cy="0"/>
         </a:xfrm>
       </p:grpSpPr>
-      <p:sp>
-        <p:nvSpPr>
-          <p:cNvPr id="3" name="Content Placeholder 2"/>
-          <p:cNvSpPr>
-            <a:spLocks noGrp="1"/>
-          </p:cNvSpPr>
-          <p:nvPr>
-            <p:ph type="body" sz="quarter" idx="10"/>
-          </p:nvPr>
-        </p:nvSpPr>
-        <p:spPr>
-          <a:xfrm>
-            <a:off x="178502" y="1139845"/>
-            <a:ext cx="11818096" cy="5528766"/>
-          </a:xfrm>
-        </p:spPr>
-        <p:txBody>
-          <a:bodyPr>
-            <a:normAutofit/>
-          </a:bodyPr>
-          <a:lstStyle/>
-          <a:p>
-            <a:r>
-              <a:rPr lang="bg-BG" sz="3599" dirty="0"/>
-              <a:t>Напишете програма, която:</a:t>
-            </a:r>
-          </a:p>
-          <a:p>
-            <a:pPr lvl="1"/>
-            <a:r>
-              <a:rPr lang="bg-BG" sz="3199" dirty="0"/>
-              <a:t>Чете от потребителя </a:t>
-            </a:r>
-            <a:r>
-              <a:rPr lang="bg-BG" sz="3199" b="1" dirty="0">
-                <a:solidFill>
-                  <a:schemeClr val="bg1"/>
-                </a:solidFill>
-              </a:rPr>
-              <a:t>цели числа</a:t>
-            </a:r>
-          </a:p>
-          <a:p>
-            <a:pPr lvl="1"/>
-            <a:r>
-              <a:rPr lang="bg-BG" sz="3199" dirty="0"/>
-              <a:t>Приключва четенето, когато получи сума, </a:t>
-            </a:r>
-            <a:r>
-              <a:rPr lang="bg-BG" sz="3199" b="1" dirty="0">
-                <a:solidFill>
-                  <a:schemeClr val="bg1"/>
-                </a:solidFill>
-              </a:rPr>
-              <a:t>по-голяма или равна на първоначално въведеното число</a:t>
-            </a:r>
-            <a:endParaRPr lang="en-US" sz="3199" b="1" dirty="0">
-              <a:solidFill>
-                <a:schemeClr val="bg1"/>
-              </a:solidFill>
-            </a:endParaRPr>
-          </a:p>
-          <a:p>
-            <a:pPr lvl="1"/>
-            <a:r>
-              <a:rPr lang="bg-BG" sz="3199" dirty="0"/>
-              <a:t>Извежда </a:t>
-            </a:r>
-            <a:r>
-              <a:rPr lang="bg-BG" sz="3199" b="1" dirty="0">
-                <a:solidFill>
-                  <a:schemeClr val="bg1"/>
-                </a:solidFill>
-              </a:rPr>
-              <a:t>сумата</a:t>
-            </a:r>
-            <a:r>
-              <a:rPr lang="bg-BG" sz="3199" dirty="0"/>
-              <a:t> на всички </a:t>
-            </a:r>
-            <a:r>
-              <a:rPr lang="bg-BG" sz="3199" b="1" dirty="0">
-                <a:solidFill>
-                  <a:schemeClr val="bg1"/>
-                </a:solidFill>
-              </a:rPr>
-              <a:t>прочетени числа</a:t>
-            </a:r>
-          </a:p>
-          <a:p>
-            <a:r>
-              <a:rPr lang="bg-BG" sz="3199" dirty="0"/>
-              <a:t>Примерен вход и изход:</a:t>
-            </a:r>
-          </a:p>
-          <a:p>
-            <a:pPr lvl="1"/>
-            <a:endParaRPr lang="en-US" sz="2799" dirty="0"/>
-          </a:p>
-          <a:p>
-            <a:pPr marL="377774" lvl="1" indent="0">
-              <a:buNone/>
-            </a:pPr>
-            <a:endParaRPr lang="bg-BG" sz="2799" dirty="0">
-              <a:solidFill>
-                <a:schemeClr val="tx2">
-                  <a:lumMod val="75000"/>
-                </a:schemeClr>
-              </a:solidFill>
-            </a:endParaRPr>
-          </a:p>
-          <a:p>
-            <a:pPr lvl="2"/>
-            <a:endParaRPr lang="en-US" sz="2799" dirty="0"/>
-          </a:p>
-          <a:p>
-            <a:pPr lvl="2"/>
-            <a:endParaRPr lang="en-US" sz="2799" dirty="0"/>
-          </a:p>
-        </p:txBody>
-      </p:sp>
-      <p:sp>
-        <p:nvSpPr>
-          <p:cNvPr id="4" name="Title 3"/>
-          <p:cNvSpPr>
-            <a:spLocks noGrp="1"/>
-          </p:cNvSpPr>
-          <p:nvPr>
-            <p:ph type="title"/>
-          </p:nvPr>
-        </p:nvSpPr>
-        <p:spPr/>
-        <p:txBody>
-          <a:bodyPr/>
-          <a:lstStyle/>
-          <a:p>
-            <a:r>
-              <a:rPr lang="bg-BG"/>
-              <a:t>Сума от числа – условие</a:t>
-            </a:r>
-            <a:endParaRPr lang="en-US" dirty="0"/>
-          </a:p>
-        </p:txBody>
-      </p:sp>
-      <p:sp>
-        <p:nvSpPr>
-          <p:cNvPr id="10" name="Rectangle 9">
-            <a:extLst>
-              <a:ext uri="{FF2B5EF4-FFF2-40B4-BE49-F238E27FC236}">
-                <a16:creationId xmlns:a16="http://schemas.microsoft.com/office/drawing/2014/main" id="{5BC9D00A-0AA5-487A-887B-5904474B0099}"/>
-              </a:ext>
-            </a:extLst>
-          </p:cNvPr>
-          <p:cNvSpPr>
-            <a:spLocks noChangeArrowheads="1"/>
-          </p:cNvSpPr>
-          <p:nvPr/>
-        </p:nvSpPr>
-        <p:spPr bwMode="auto">
-          <a:xfrm>
-            <a:off x="5677305" y="4384688"/>
-            <a:ext cx="1147020" cy="2138399"/>
-          </a:xfrm>
-          <a:prstGeom prst="rect">
-            <a:avLst/>
-          </a:prstGeom>
-          <a:solidFill>
-            <a:schemeClr val="accent5">
-              <a:lumMod val="60000"/>
-              <a:lumOff val="40000"/>
-              <a:alpha val="20000"/>
-            </a:schemeClr>
-          </a:solidFill>
-          <a:ln w="12700">
-            <a:solidFill>
-              <a:schemeClr val="accent5">
-                <a:lumMod val="60000"/>
-                <a:lumOff val="40000"/>
-              </a:schemeClr>
-            </a:solidFill>
-          </a:ln>
-        </p:spPr>
-        <p:txBody>
-          <a:bodyPr wrap="square" anchor="ctr">
-            <a:noAutofit/>
-          </a:bodyPr>
-          <a:lstStyle/>
-          <a:p>
-            <a:r>
-              <a:rPr lang="en-US" sz="2599" b="1" dirty="0"/>
-              <a:t>100</a:t>
-            </a:r>
-          </a:p>
-          <a:p>
-            <a:r>
-              <a:rPr lang="en-US" sz="2599" b="1" dirty="0"/>
-              <a:t>10</a:t>
-            </a:r>
-          </a:p>
-          <a:p>
-            <a:r>
-              <a:rPr lang="en-US" sz="2599" b="1" dirty="0"/>
-              <a:t>20</a:t>
-            </a:r>
-          </a:p>
-          <a:p>
-            <a:r>
-              <a:rPr lang="en-US" sz="2599" b="1" dirty="0"/>
-              <a:t>30</a:t>
-            </a:r>
-          </a:p>
-          <a:p>
-            <a:r>
-              <a:rPr lang="en-US" sz="2599" b="1" dirty="0"/>
-              <a:t>45</a:t>
-            </a:r>
-          </a:p>
-        </p:txBody>
-      </p:sp>
-      <p:sp>
-        <p:nvSpPr>
-          <p:cNvPr id="11" name="Right Arrow 11">
-            <a:extLst>
-              <a:ext uri="{FF2B5EF4-FFF2-40B4-BE49-F238E27FC236}">
-                <a16:creationId xmlns:a16="http://schemas.microsoft.com/office/drawing/2014/main" id="{CA100D17-5BE1-4626-AB26-76ED6669B30A}"/>
-              </a:ext>
-            </a:extLst>
-          </p:cNvPr>
-          <p:cNvSpPr/>
-          <p:nvPr/>
-        </p:nvSpPr>
-        <p:spPr>
-          <a:xfrm>
-            <a:off x="7100647" y="5301527"/>
-            <a:ext cx="402682" cy="304721"/>
-          </a:xfrm>
-          <a:prstGeom prst="rightArrow">
-            <a:avLst/>
-          </a:prstGeom>
-        </p:spPr>
-        <p:style>
-          <a:lnRef idx="2">
-            <a:schemeClr val="accent1">
-              <a:shade val="50000"/>
-            </a:schemeClr>
-          </a:lnRef>
-          <a:fillRef idx="1">
-            <a:schemeClr val="accent1"/>
-          </a:fillRef>
-          <a:effectRef idx="0">
-            <a:schemeClr val="accent1"/>
-          </a:effectRef>
-          <a:fontRef idx="minor">
-            <a:schemeClr val="lt1"/>
-          </a:fontRef>
-        </p:style>
-        <p:txBody>
-          <a:bodyPr rtlCol="0" anchor="ctr"/>
-          <a:lstStyle/>
-          <a:p>
-            <a:pPr algn="ctr"/>
-            <a:endParaRPr lang="en-US" sz="2799" dirty="0"/>
-          </a:p>
-        </p:txBody>
-      </p:sp>
-      <p:sp>
-        <p:nvSpPr>
-          <p:cNvPr id="12" name="Rectangle 10">
-            <a:extLst>
-              <a:ext uri="{FF2B5EF4-FFF2-40B4-BE49-F238E27FC236}">
-                <a16:creationId xmlns:a16="http://schemas.microsoft.com/office/drawing/2014/main" id="{51A38C55-69A4-4F90-8F17-AF8886D2B2BC}"/>
-              </a:ext>
-            </a:extLst>
-          </p:cNvPr>
-          <p:cNvSpPr>
-            <a:spLocks noChangeArrowheads="1"/>
-          </p:cNvSpPr>
-          <p:nvPr/>
-        </p:nvSpPr>
-        <p:spPr bwMode="auto">
-          <a:xfrm>
-            <a:off x="7724496" y="5207528"/>
-            <a:ext cx="747394" cy="492721"/>
-          </a:xfrm>
-          <a:prstGeom prst="rect">
-            <a:avLst/>
-          </a:prstGeom>
-          <a:solidFill>
-            <a:schemeClr val="accent5">
-              <a:lumMod val="60000"/>
-              <a:lumOff val="40000"/>
-              <a:alpha val="20000"/>
-            </a:schemeClr>
-          </a:solidFill>
-          <a:ln w="12700">
-            <a:solidFill>
-              <a:schemeClr val="accent5">
-                <a:lumMod val="60000"/>
-                <a:lumOff val="40000"/>
-              </a:schemeClr>
-            </a:solidFill>
-          </a:ln>
-        </p:spPr>
-        <p:txBody>
-          <a:bodyPr wrap="square">
-            <a:noAutofit/>
-          </a:bodyPr>
-          <a:lstStyle/>
-          <a:p>
-            <a:r>
-              <a:rPr lang="bg-BG" sz="2599" b="1" dirty="0">
-                <a:latin typeface="Consolas" pitchFamily="49" charset="0"/>
-                <a:cs typeface="Consolas" pitchFamily="49" charset="0"/>
-              </a:rPr>
-              <a:t>105</a:t>
-            </a:r>
-            <a:endParaRPr lang="bg-BG" sz="2599" b="1" noProof="1">
-              <a:latin typeface="Consolas" pitchFamily="49" charset="0"/>
-              <a:cs typeface="Consolas" pitchFamily="49" charset="0"/>
-            </a:endParaRPr>
-          </a:p>
-        </p:txBody>
-      </p:sp>
-      <p:sp>
-        <p:nvSpPr>
-          <p:cNvPr id="8" name="Rectangle 7">
-            <a:extLst>
-              <a:ext uri="{FF2B5EF4-FFF2-40B4-BE49-F238E27FC236}">
-                <a16:creationId xmlns:a16="http://schemas.microsoft.com/office/drawing/2014/main" id="{9C39E08B-6909-4551-93E1-0EFE28FA2DBF}"/>
-              </a:ext>
-            </a:extLst>
-          </p:cNvPr>
-          <p:cNvSpPr>
-            <a:spLocks noChangeArrowheads="1"/>
-          </p:cNvSpPr>
-          <p:nvPr/>
-        </p:nvSpPr>
-        <p:spPr bwMode="auto">
-          <a:xfrm>
-            <a:off x="9074716" y="3994653"/>
-            <a:ext cx="1147020" cy="2808468"/>
-          </a:xfrm>
-          <a:prstGeom prst="rect">
-            <a:avLst/>
-          </a:prstGeom>
-          <a:solidFill>
-            <a:schemeClr val="accent5">
-              <a:lumMod val="60000"/>
-              <a:lumOff val="40000"/>
-              <a:alpha val="20000"/>
-            </a:schemeClr>
-          </a:solidFill>
-          <a:ln w="12700">
-            <a:solidFill>
-              <a:schemeClr val="accent5">
-                <a:lumMod val="60000"/>
-                <a:lumOff val="40000"/>
-              </a:schemeClr>
-            </a:solidFill>
-          </a:ln>
-        </p:spPr>
-        <p:txBody>
-          <a:bodyPr wrap="square" anchor="ctr">
-            <a:noAutofit/>
-          </a:bodyPr>
-          <a:lstStyle/>
-          <a:p>
-            <a:r>
-              <a:rPr lang="en-US" sz="2599" b="1" dirty="0"/>
-              <a:t>20</a:t>
-            </a:r>
-          </a:p>
-          <a:p>
-            <a:r>
-              <a:rPr lang="en-US" sz="2599" b="1" dirty="0"/>
-              <a:t>1</a:t>
-            </a:r>
-            <a:endParaRPr lang="bg-BG" sz="2599" b="1" dirty="0"/>
-          </a:p>
-          <a:p>
-            <a:r>
-              <a:rPr lang="en-US" sz="2599" b="1" dirty="0"/>
-              <a:t>2</a:t>
-            </a:r>
-          </a:p>
-          <a:p>
-            <a:r>
-              <a:rPr lang="en-US" sz="2599" b="1" dirty="0"/>
-              <a:t>3</a:t>
-            </a:r>
-          </a:p>
-          <a:p>
-            <a:r>
-              <a:rPr lang="en-US" sz="2599" b="1" dirty="0"/>
-              <a:t>4</a:t>
-            </a:r>
-            <a:endParaRPr lang="bg-BG" sz="2599" b="1" dirty="0"/>
-          </a:p>
-          <a:p>
-            <a:r>
-              <a:rPr lang="en-US" sz="2599" b="1" dirty="0"/>
-              <a:t>5</a:t>
-            </a:r>
-            <a:endParaRPr lang="bg-BG" sz="2599" b="1" dirty="0"/>
-          </a:p>
-          <a:p>
-            <a:r>
-              <a:rPr lang="bg-BG" sz="2599" b="1" dirty="0"/>
-              <a:t>6</a:t>
-            </a:r>
-            <a:endParaRPr lang="en-US" sz="2599" b="1" dirty="0"/>
-          </a:p>
-        </p:txBody>
-      </p:sp>
-      <p:sp>
-        <p:nvSpPr>
-          <p:cNvPr id="13" name="Rectangle 10">
-            <a:extLst>
-              <a:ext uri="{FF2B5EF4-FFF2-40B4-BE49-F238E27FC236}">
-                <a16:creationId xmlns:a16="http://schemas.microsoft.com/office/drawing/2014/main" id="{AF485882-4E01-4D7E-B206-D2092B347BC9}"/>
-              </a:ext>
-            </a:extLst>
-          </p:cNvPr>
-          <p:cNvSpPr>
-            <a:spLocks noChangeArrowheads="1"/>
-          </p:cNvSpPr>
-          <p:nvPr/>
-        </p:nvSpPr>
-        <p:spPr bwMode="auto">
-          <a:xfrm>
-            <a:off x="11124999" y="5152527"/>
-            <a:ext cx="549549" cy="492721"/>
-          </a:xfrm>
-          <a:prstGeom prst="rect">
-            <a:avLst/>
-          </a:prstGeom>
-          <a:solidFill>
-            <a:schemeClr val="accent5">
-              <a:lumMod val="60000"/>
-              <a:lumOff val="40000"/>
-              <a:alpha val="20000"/>
-            </a:schemeClr>
-          </a:solidFill>
-          <a:ln w="12700">
-            <a:solidFill>
-              <a:schemeClr val="accent5">
-                <a:lumMod val="60000"/>
-                <a:lumOff val="40000"/>
-              </a:schemeClr>
-            </a:solidFill>
-          </a:ln>
-        </p:spPr>
-        <p:txBody>
-          <a:bodyPr wrap="square">
-            <a:noAutofit/>
-          </a:bodyPr>
-          <a:lstStyle/>
-          <a:p>
-            <a:r>
-              <a:rPr lang="en-US" sz="2599" b="1" dirty="0">
-                <a:latin typeface="Consolas" pitchFamily="49" charset="0"/>
-                <a:cs typeface="Consolas" pitchFamily="49" charset="0"/>
-              </a:rPr>
-              <a:t>2</a:t>
-            </a:r>
-            <a:r>
-              <a:rPr lang="bg-BG" sz="2599" b="1" dirty="0">
-                <a:latin typeface="Consolas" pitchFamily="49" charset="0"/>
-                <a:cs typeface="Consolas" pitchFamily="49" charset="0"/>
-              </a:rPr>
-              <a:t>1</a:t>
-            </a:r>
-            <a:endParaRPr lang="bg-BG" sz="2599" b="1" noProof="1">
-              <a:latin typeface="Consolas" pitchFamily="49" charset="0"/>
-              <a:cs typeface="Consolas" pitchFamily="49" charset="0"/>
-            </a:endParaRPr>
-          </a:p>
-        </p:txBody>
-      </p:sp>
-      <p:sp>
-        <p:nvSpPr>
-          <p:cNvPr id="14" name="Right Arrow 11">
-            <a:extLst>
-              <a:ext uri="{FF2B5EF4-FFF2-40B4-BE49-F238E27FC236}">
-                <a16:creationId xmlns:a16="http://schemas.microsoft.com/office/drawing/2014/main" id="{1486ED7A-EEE8-48DC-A9B0-2BDA1047B870}"/>
-              </a:ext>
-            </a:extLst>
-          </p:cNvPr>
-          <p:cNvSpPr/>
-          <p:nvPr/>
-        </p:nvSpPr>
-        <p:spPr>
-          <a:xfrm>
-            <a:off x="10336421" y="5246527"/>
-            <a:ext cx="402682" cy="304721"/>
-          </a:xfrm>
-          <a:prstGeom prst="rightArrow">
-            <a:avLst/>
-          </a:prstGeom>
-        </p:spPr>
-        <p:style>
-          <a:lnRef idx="2">
-            <a:schemeClr val="accent1">
-              <a:shade val="50000"/>
-            </a:schemeClr>
-          </a:lnRef>
-          <a:fillRef idx="1">
-            <a:schemeClr val="accent1"/>
-          </a:fillRef>
-          <a:effectRef idx="0">
-            <a:schemeClr val="accent1"/>
-          </a:effectRef>
-          <a:fontRef idx="minor">
-            <a:schemeClr val="lt1"/>
-          </a:fontRef>
-        </p:style>
-        <p:txBody>
-          <a:bodyPr rtlCol="0" anchor="ctr"/>
-          <a:lstStyle/>
-          <a:p>
-            <a:pPr algn="ctr"/>
-            <a:endParaRPr lang="en-US" sz="2799" dirty="0"/>
-          </a:p>
-        </p:txBody>
-      </p:sp>
-      <p:sp>
-        <p:nvSpPr>
-          <p:cNvPr id="15" name="Slide Number">
-            <a:extLst>
-              <a:ext uri="{FF2B5EF4-FFF2-40B4-BE49-F238E27FC236}">
-                <a16:creationId xmlns:a16="http://schemas.microsoft.com/office/drawing/2014/main" id="{EFC6E04B-EC63-411F-8A06-A71D797FFCDA}"/>
-              </a:ext>
-            </a:extLst>
-          </p:cNvPr>
-          <p:cNvSpPr>
-            <a:spLocks noGrp="1"/>
-          </p:cNvSpPr>
-          <p:nvPr>
-            <p:ph type="sldNum" sz="quarter" idx="5"/>
-          </p:nvPr>
-        </p:nvSpPr>
-        <p:spPr>
-          <a:xfrm>
-            <a:off x="11753030" y="6507000"/>
-            <a:ext cx="367414" cy="297000"/>
-          </a:xfrm>
-          <a:prstGeom prst="rect">
-            <a:avLst/>
-          </a:prstGeom>
-        </p:spPr>
-        <p:txBody>
-          <a:bodyPr vert="horz" lIns="91440" tIns="45720" rIns="91440" bIns="45720" rtlCol="0" anchor="b"/>
-          <a:lstStyle>
-            <a:lvl1pPr algn="r">
-              <a:defRPr sz="1000"/>
-            </a:lvl1pPr>
-          </a:lstStyle>
-          <a:p>
-            <a:fld id="{2BF067CD-8E6B-4360-9AA8-C5DF2A48A6D1}" type="slidenum">
-              <a:rPr lang="en-US" noProof="0" smtClean="0"/>
-              <a:pPr/>
-              <a:t>27</a:t>
-            </a:fld>
-            <a:endParaRPr lang="en-US" noProof="0" dirty="0"/>
-          </a:p>
-        </p:txBody>
-      </p:sp>
-    </p:spTree>
-    <p:extLst>
-      <p:ext uri="{BB962C8B-B14F-4D97-AF65-F5344CB8AC3E}">
-        <p14:creationId xmlns:p14="http://schemas.microsoft.com/office/powerpoint/2010/main" val="1059057608"/>
-      </p:ext>
-    </p:extLst>
-  </p:cSld>
-  <p:clrMapOvr>
-    <a:masterClrMapping/>
-  </p:clrMapOvr>
-  <mc:AlternateContent xmlns:mc="http://schemas.openxmlformats.org/markup-compatibility/2006" xmlns:p14="http://schemas.microsoft.com/office/powerpoint/2010/main">
-    <mc:Choice Requires="p14">
-      <p:transition p14:dur="0" advClick="0" advTm="5000"/>
-    </mc:Choice>
-    <mc:Fallback xmlns="">
-      <p:transition advClick="0" advTm="5000"/>
-    </mc:Fallback>
-  </mc:AlternateContent>
-  <p:timing>
-    <p:tnLst>
-      <p:par>
-        <p:cTn id="1" dur="indefinite" restart="never" nodeType="tmRoot">
-          <p:childTnLst>
-            <p:seq concurrent="1" nextAc="seek">
-              <p:cTn id="2" dur="indefinite" nodeType="mainSeq">
-                <p:childTnLst>
-                  <p:par>
-                    <p:cTn id="3" fill="hold">
-                      <p:stCondLst>
-                        <p:cond delay="indefinite"/>
-                      </p:stCondLst>
-                      <p:childTnLst>
-                        <p:par>
-                          <p:cTn id="4" fill="hold">
-                            <p:stCondLst>
-                              <p:cond delay="0"/>
-                            </p:stCondLst>
-                            <p:childTnLst>
-                              <p:par>
-                                <p:cTn id="5" presetID="1" presetClass="entr" presetSubtype="0" fill="hold" nodeType="clickEffect">
-                                  <p:stCondLst>
-                                    <p:cond delay="0"/>
-                                  </p:stCondLst>
-                                  <p:childTnLst>
-                                    <p:set>
-                                      <p:cBhvr>
-                                        <p:cTn id="6" dur="1" fill="hold">
-                                          <p:stCondLst>
-                                            <p:cond delay="0"/>
-                                          </p:stCondLst>
-                                        </p:cTn>
-                                        <p:tgtEl>
-                                          <p:spTgt spid="3">
-                                            <p:txEl>
-                                              <p:pRg st="2" end="2"/>
-                                            </p:txEl>
-                                          </p:spTgt>
-                                        </p:tgtEl>
-                                        <p:attrNameLst>
-                                          <p:attrName>style.visibility</p:attrName>
-                                        </p:attrNameLst>
-                                      </p:cBhvr>
-                                      <p:to>
-                                        <p:strVal val="visible"/>
-                                      </p:to>
-                                    </p:set>
-                                  </p:childTnLst>
-                                </p:cTn>
-                              </p:par>
-                            </p:childTnLst>
-                          </p:cTn>
-                        </p:par>
-                      </p:childTnLst>
-                    </p:cTn>
-                  </p:par>
-                  <p:par>
-                    <p:cTn id="7" fill="hold">
-                      <p:stCondLst>
-                        <p:cond delay="indefinite"/>
-                      </p:stCondLst>
-                      <p:childTnLst>
-                        <p:par>
-                          <p:cTn id="8" fill="hold">
-                            <p:stCondLst>
-                              <p:cond delay="0"/>
-                            </p:stCondLst>
-                            <p:childTnLst>
-                              <p:par>
-                                <p:cTn id="9" presetID="1" presetClass="entr" presetSubtype="0" fill="hold" nodeType="clickEffect">
-                                  <p:stCondLst>
-                                    <p:cond delay="0"/>
-                                  </p:stCondLst>
-                                  <p:childTnLst>
-                                    <p:set>
-                                      <p:cBhvr>
-                                        <p:cTn id="10" dur="1" fill="hold">
-                                          <p:stCondLst>
-                                            <p:cond delay="0"/>
-                                          </p:stCondLst>
-                                        </p:cTn>
-                                        <p:tgtEl>
-                                          <p:spTgt spid="3">
-                                            <p:txEl>
-                                              <p:pRg st="3" end="3"/>
-                                            </p:txEl>
-                                          </p:spTgt>
-                                        </p:tgtEl>
-                                        <p:attrNameLst>
-                                          <p:attrName>style.visibility</p:attrName>
-                                        </p:attrNameLst>
-                                      </p:cBhvr>
-                                      <p:to>
-                                        <p:strVal val="visible"/>
-                                      </p:to>
-                                    </p:set>
-                                  </p:childTnLst>
-                                </p:cTn>
-                              </p:par>
-                            </p:childTnLst>
-                          </p:cTn>
-                        </p:par>
-                      </p:childTnLst>
-                    </p:cTn>
-                  </p:par>
-                  <p:par>
-                    <p:cTn id="11" fill="hold">
-                      <p:stCondLst>
-                        <p:cond delay="indefinite"/>
-                      </p:stCondLst>
-                      <p:childTnLst>
-                        <p:par>
-                          <p:cTn id="12" fill="hold">
-                            <p:stCondLst>
-                              <p:cond delay="0"/>
-                            </p:stCondLst>
-                            <p:childTnLst>
-                              <p:par>
-                                <p:cTn id="13" presetID="1" presetClass="entr" presetSubtype="0" fill="hold" nodeType="clickEffect">
-                                  <p:stCondLst>
-                                    <p:cond delay="0"/>
-                                  </p:stCondLst>
-                                  <p:childTnLst>
-                                    <p:set>
-                                      <p:cBhvr>
-                                        <p:cTn id="14" dur="1" fill="hold">
-                                          <p:stCondLst>
-                                            <p:cond delay="0"/>
-                                          </p:stCondLst>
-                                        </p:cTn>
-                                        <p:tgtEl>
-                                          <p:spTgt spid="3">
-                                            <p:txEl>
-                                              <p:pRg st="4" end="4"/>
-                                            </p:txEl>
-                                          </p:spTgt>
-                                        </p:tgtEl>
-                                        <p:attrNameLst>
-                                          <p:attrName>style.visibility</p:attrName>
-                                        </p:attrNameLst>
-                                      </p:cBhvr>
-                                      <p:to>
-                                        <p:strVal val="visible"/>
-                                      </p:to>
-                                    </p:set>
-                                  </p:childTnLst>
-                                </p:cTn>
-                              </p:par>
-                              <p:par>
-                                <p:cTn id="15" presetID="1" presetClass="entr" presetSubtype="0" fill="hold" grpId="0" nodeType="withEffect">
-                                  <p:stCondLst>
-                                    <p:cond delay="0"/>
-                                  </p:stCondLst>
-                                  <p:childTnLst>
-                                    <p:set>
-                                      <p:cBhvr>
-                                        <p:cTn id="16" dur="1" fill="hold">
-                                          <p:stCondLst>
-                                            <p:cond delay="0"/>
-                                          </p:stCondLst>
-                                        </p:cTn>
-                                        <p:tgtEl>
-                                          <p:spTgt spid="10"/>
-                                        </p:tgtEl>
-                                        <p:attrNameLst>
-                                          <p:attrName>style.visibility</p:attrName>
-                                        </p:attrNameLst>
-                                      </p:cBhvr>
-                                      <p:to>
-                                        <p:strVal val="visible"/>
-                                      </p:to>
-                                    </p:set>
-                                  </p:childTnLst>
-                                </p:cTn>
-                              </p:par>
-                              <p:par>
-                                <p:cTn id="17" presetID="1" presetClass="entr" presetSubtype="0" fill="hold" grpId="0" nodeType="withEffect">
-                                  <p:stCondLst>
-                                    <p:cond delay="0"/>
-                                  </p:stCondLst>
-                                  <p:childTnLst>
-                                    <p:set>
-                                      <p:cBhvr>
-                                        <p:cTn id="18" dur="1" fill="hold">
-                                          <p:stCondLst>
-                                            <p:cond delay="0"/>
-                                          </p:stCondLst>
-                                        </p:cTn>
-                                        <p:tgtEl>
-                                          <p:spTgt spid="11"/>
-                                        </p:tgtEl>
-                                        <p:attrNameLst>
-                                          <p:attrName>style.visibility</p:attrName>
-                                        </p:attrNameLst>
-                                      </p:cBhvr>
-                                      <p:to>
-                                        <p:strVal val="visible"/>
-                                      </p:to>
-                                    </p:set>
-                                  </p:childTnLst>
-                                </p:cTn>
-                              </p:par>
-                              <p:par>
-                                <p:cTn id="19" presetID="1" presetClass="entr" presetSubtype="0" fill="hold" grpId="0" nodeType="withEffect">
-                                  <p:stCondLst>
-                                    <p:cond delay="0"/>
-                                  </p:stCondLst>
-                                  <p:childTnLst>
-                                    <p:set>
-                                      <p:cBhvr>
-                                        <p:cTn id="20" dur="1" fill="hold">
-                                          <p:stCondLst>
-                                            <p:cond delay="0"/>
-                                          </p:stCondLst>
-                                        </p:cTn>
-                                        <p:tgtEl>
-                                          <p:spTgt spid="12"/>
-                                        </p:tgtEl>
-                                        <p:attrNameLst>
-                                          <p:attrName>style.visibility</p:attrName>
-                                        </p:attrNameLst>
-                                      </p:cBhvr>
-                                      <p:to>
-                                        <p:strVal val="visible"/>
-                                      </p:to>
-                                    </p:set>
-                                  </p:childTnLst>
-                                </p:cTn>
-                              </p:par>
-                              <p:par>
-                                <p:cTn id="21" presetID="1" presetClass="entr" presetSubtype="0" fill="hold" grpId="0" nodeType="withEffect">
-                                  <p:stCondLst>
-                                    <p:cond delay="0"/>
-                                  </p:stCondLst>
-                                  <p:childTnLst>
-                                    <p:set>
-                                      <p:cBhvr>
-                                        <p:cTn id="22" dur="1" fill="hold">
-                                          <p:stCondLst>
-                                            <p:cond delay="0"/>
-                                          </p:stCondLst>
-                                        </p:cTn>
-                                        <p:tgtEl>
-                                          <p:spTgt spid="8"/>
-                                        </p:tgtEl>
-                                        <p:attrNameLst>
-                                          <p:attrName>style.visibility</p:attrName>
-                                        </p:attrNameLst>
-                                      </p:cBhvr>
-                                      <p:to>
-                                        <p:strVal val="visible"/>
-                                      </p:to>
-                                    </p:set>
-                                  </p:childTnLst>
-                                </p:cTn>
-                              </p:par>
-                              <p:par>
-                                <p:cTn id="23" presetID="1" presetClass="entr" presetSubtype="0" fill="hold" grpId="0" nodeType="withEffect">
-                                  <p:stCondLst>
-                                    <p:cond delay="0"/>
-                                  </p:stCondLst>
-                                  <p:childTnLst>
-                                    <p:set>
-                                      <p:cBhvr>
-                                        <p:cTn id="24" dur="1" fill="hold">
-                                          <p:stCondLst>
-                                            <p:cond delay="0"/>
-                                          </p:stCondLst>
-                                        </p:cTn>
-                                        <p:tgtEl>
-                                          <p:spTgt spid="13"/>
-                                        </p:tgtEl>
-                                        <p:attrNameLst>
-                                          <p:attrName>style.visibility</p:attrName>
-                                        </p:attrNameLst>
-                                      </p:cBhvr>
-                                      <p:to>
-                                        <p:strVal val="visible"/>
-                                      </p:to>
-                                    </p:set>
-                                  </p:childTnLst>
-                                </p:cTn>
-                              </p:par>
-                              <p:par>
-                                <p:cTn id="25" presetID="1" presetClass="entr" presetSubtype="0" fill="hold" grpId="0" nodeType="withEffect">
-                                  <p:stCondLst>
-                                    <p:cond delay="0"/>
-                                  </p:stCondLst>
-                                  <p:childTnLst>
-                                    <p:set>
-                                      <p:cBhvr>
-                                        <p:cTn id="26" dur="1" fill="hold">
-                                          <p:stCondLst>
-                                            <p:cond delay="0"/>
-                                          </p:stCondLst>
-                                        </p:cTn>
-                                        <p:tgtEl>
-                                          <p:spTgt spid="14"/>
-                                        </p:tgtEl>
-                                        <p:attrNameLst>
-                                          <p:attrName>style.visibility</p:attrName>
-                                        </p:attrNameLst>
-                                      </p:cBhvr>
-                                      <p:to>
-                                        <p:strVal val="visible"/>
-                                      </p:to>
-                                    </p:set>
-                                  </p:childTnLst>
-                                </p:cTn>
-                              </p:par>
-                            </p:childTnLst>
-                          </p:cTn>
-                        </p:par>
-                      </p:childTnLst>
-                    </p:cTn>
-                  </p:par>
-                </p:childTnLst>
-              </p:cTn>
-              <p:prevCondLst>
-                <p:cond evt="onPrev" delay="0">
-                  <p:tgtEl>
-                    <p:sldTgt/>
-                  </p:tgtEl>
-                </p:cond>
-              </p:prevCondLst>
-              <p:nextCondLst>
-                <p:cond evt="onNext" delay="0">
-                  <p:tgtEl>
-                    <p:sldTgt/>
-                  </p:tgtEl>
-                </p:cond>
-              </p:nextCondLst>
-            </p:seq>
-          </p:childTnLst>
-        </p:cTn>
-      </p:par>
-    </p:tnLst>
-    <p:bldLst>
-      <p:bldP spid="10" grpId="0" animBg="1"/>
-      <p:bldP spid="11" grpId="0" animBg="1"/>
-      <p:bldP spid="12" grpId="0" animBg="1"/>
-      <p:bldP spid="8" grpId="0" animBg="1"/>
-      <p:bldP spid="13" grpId="0" animBg="1"/>
-      <p:bldP spid="14" grpId="0" animBg="1"/>
-    </p:bldLst>
-  </p:timing>
-</p:sld>
-</file>
-
-<file path=ppt/slides/slide28.xml><?xml version="1.0" encoding="utf-8"?>
-<p:sld xmlns:a="http://schemas.openxmlformats.org/drawingml/2006/main" xmlns:r="http://schemas.openxmlformats.org/officeDocument/2006/relationships" xmlns:p="http://schemas.openxmlformats.org/presentationml/2006/main">
-  <p:cSld>
-    <p:spTree>
-      <p:nvGrpSpPr>
-        <p:cNvPr id="1" name=""/>
-        <p:cNvGrpSpPr/>
-        <p:nvPr/>
-      </p:nvGrpSpPr>
-      <p:grpSpPr>
-        <a:xfrm>
-          <a:off x="0" y="0"/>
-          <a:ext cx="0" cy="0"/>
-          <a:chOff x="0" y="0"/>
-          <a:chExt cx="0" cy="0"/>
-        </a:xfrm>
-      </p:grpSpPr>
-      <p:sp>
-        <p:nvSpPr>
-          <p:cNvPr id="4" name="Title 3"/>
-          <p:cNvSpPr>
-            <a:spLocks noGrp="1"/>
-          </p:cNvSpPr>
-          <p:nvPr>
-            <p:ph type="title"/>
-          </p:nvPr>
-        </p:nvSpPr>
-        <p:spPr/>
-        <p:txBody>
-          <a:bodyPr/>
-          <a:lstStyle/>
-          <a:p>
-            <a:r>
-              <a:rPr lang="bg-BG"/>
-              <a:t>Сума от числа – решение</a:t>
-            </a:r>
-            <a:endParaRPr lang="en-US" dirty="0"/>
-          </a:p>
-        </p:txBody>
-      </p:sp>
-      <p:sp>
-        <p:nvSpPr>
-          <p:cNvPr id="7" name="Rectangle 5">
-            <a:extLst>
-              <a:ext uri="{FF2B5EF4-FFF2-40B4-BE49-F238E27FC236}">
-                <a16:creationId xmlns:a16="http://schemas.microsoft.com/office/drawing/2014/main" id="{022387E3-FA6A-402A-9CE2-FE3E2838D676}"/>
-              </a:ext>
-            </a:extLst>
-          </p:cNvPr>
-          <p:cNvSpPr>
-            <a:spLocks noChangeArrowheads="1"/>
-          </p:cNvSpPr>
-          <p:nvPr/>
-        </p:nvSpPr>
-        <p:spPr bwMode="auto">
-          <a:xfrm>
-            <a:off x="1110505" y="1539492"/>
-            <a:ext cx="9929443" cy="3969284"/>
-          </a:xfrm>
-          <a:prstGeom prst="rect">
-            <a:avLst/>
-          </a:prstGeom>
-          <a:solidFill>
-            <a:schemeClr val="accent5">
-              <a:lumMod val="60000"/>
-              <a:lumOff val="40000"/>
-              <a:alpha val="20000"/>
-            </a:schemeClr>
-          </a:solidFill>
-          <a:ln w="12700">
-            <a:solidFill>
-              <a:schemeClr val="accent5">
-                <a:lumMod val="60000"/>
-                <a:lumOff val="40000"/>
-              </a:schemeClr>
-            </a:solidFill>
-          </a:ln>
-        </p:spPr>
-        <p:txBody>
-          <a:bodyPr wrap="square">
-            <a:spAutoFit/>
-          </a:bodyPr>
-          <a:lstStyle/>
-          <a:p>
-            <a:pPr eaLnBrk="0" hangingPunct="0">
-              <a:buClr>
-                <a:schemeClr val="accent5">
-                  <a:lumMod val="40000"/>
-                  <a:lumOff val="60000"/>
-                </a:schemeClr>
-              </a:buClr>
-              <a:buSzPct val="70000"/>
-            </a:pPr>
-            <a:r>
-              <a:rPr lang="pt-BR" sz="2799" b="1" noProof="1">
-                <a:latin typeface="Consolas" pitchFamily="49" charset="0"/>
-                <a:cs typeface="Consolas" pitchFamily="49" charset="0"/>
-              </a:rPr>
-              <a:t>int n = int.Parse(Console.ReadLine());</a:t>
-            </a:r>
-          </a:p>
-          <a:p>
-            <a:pPr eaLnBrk="0" hangingPunct="0">
-              <a:buClr>
-                <a:schemeClr val="accent5">
-                  <a:lumMod val="40000"/>
-                  <a:lumOff val="60000"/>
-                </a:schemeClr>
-              </a:buClr>
-              <a:buSzPct val="70000"/>
-            </a:pPr>
-            <a:r>
-              <a:rPr lang="pt-BR" sz="2799" b="1" noProof="1">
-                <a:latin typeface="Consolas" pitchFamily="49" charset="0"/>
-                <a:cs typeface="Consolas" pitchFamily="49" charset="0"/>
-              </a:rPr>
-              <a:t>int sum = 0;</a:t>
-            </a:r>
-          </a:p>
-          <a:p>
-            <a:pPr eaLnBrk="0" hangingPunct="0">
-              <a:buClr>
-                <a:schemeClr val="accent5">
-                  <a:lumMod val="40000"/>
-                  <a:lumOff val="60000"/>
-                </a:schemeClr>
-              </a:buClr>
-              <a:buSzPct val="70000"/>
-            </a:pPr>
-            <a:endParaRPr lang="pt-BR" sz="2799" b="1" noProof="1">
-              <a:latin typeface="Consolas" pitchFamily="49" charset="0"/>
-              <a:cs typeface="Consolas" pitchFamily="49" charset="0"/>
-            </a:endParaRPr>
-          </a:p>
-          <a:p>
-            <a:pPr eaLnBrk="0" hangingPunct="0">
-              <a:buClr>
-                <a:schemeClr val="accent5">
-                  <a:lumMod val="40000"/>
-                  <a:lumOff val="60000"/>
-                </a:schemeClr>
-              </a:buClr>
-              <a:buSzPct val="70000"/>
-            </a:pPr>
-            <a:r>
-              <a:rPr lang="pt-BR" sz="2799" b="1" noProof="1">
-                <a:solidFill>
-                  <a:schemeClr val="bg1"/>
-                </a:solidFill>
-                <a:latin typeface="Consolas" pitchFamily="49" charset="0"/>
-                <a:cs typeface="Consolas" pitchFamily="49" charset="0"/>
-              </a:rPr>
-              <a:t>while</a:t>
-            </a:r>
-            <a:r>
-              <a:rPr lang="pt-BR" sz="2799" b="1" noProof="1">
-                <a:latin typeface="Consolas" pitchFamily="49" charset="0"/>
-                <a:cs typeface="Consolas" pitchFamily="49" charset="0"/>
-              </a:rPr>
-              <a:t> (sum &lt; </a:t>
-            </a:r>
-            <a:r>
-              <a:rPr lang="en-US" sz="2799" b="1" noProof="1">
-                <a:latin typeface="Consolas" pitchFamily="49" charset="0"/>
-                <a:cs typeface="Consolas" pitchFamily="49" charset="0"/>
-              </a:rPr>
-              <a:t>n</a:t>
-            </a:r>
-            <a:r>
-              <a:rPr lang="pt-BR" sz="2799" b="1" noProof="1">
-                <a:latin typeface="Consolas" pitchFamily="49" charset="0"/>
-                <a:cs typeface="Consolas" pitchFamily="49" charset="0"/>
-              </a:rPr>
-              <a:t>) </a:t>
-            </a:r>
-          </a:p>
-          <a:p>
-            <a:pPr eaLnBrk="0" hangingPunct="0">
-              <a:buClr>
-                <a:schemeClr val="accent5">
-                  <a:lumMod val="40000"/>
-                  <a:lumOff val="60000"/>
-                </a:schemeClr>
-              </a:buClr>
-              <a:buSzPct val="70000"/>
-            </a:pPr>
-            <a:r>
-              <a:rPr lang="pt-BR" sz="2799" b="1" noProof="1">
-                <a:solidFill>
-                  <a:schemeClr val="bg1"/>
-                </a:solidFill>
-                <a:latin typeface="Consolas" pitchFamily="49" charset="0"/>
-                <a:cs typeface="Consolas" pitchFamily="49" charset="0"/>
-              </a:rPr>
-              <a:t>{</a:t>
-            </a:r>
-            <a:endParaRPr lang="pt-BR" sz="2799" b="1" noProof="1">
-              <a:latin typeface="Consolas" pitchFamily="49" charset="0"/>
-              <a:cs typeface="Consolas" pitchFamily="49" charset="0"/>
-            </a:endParaRPr>
-          </a:p>
-          <a:p>
-            <a:pPr eaLnBrk="0" hangingPunct="0">
-              <a:buClr>
-                <a:schemeClr val="accent5">
-                  <a:lumMod val="40000"/>
-                  <a:lumOff val="60000"/>
-                </a:schemeClr>
-              </a:buClr>
-              <a:buSzPct val="70000"/>
-            </a:pPr>
-            <a:r>
-              <a:rPr lang="pt-BR" sz="2799" b="1" noProof="1">
-                <a:latin typeface="Consolas" pitchFamily="49" charset="0"/>
-                <a:cs typeface="Consolas" pitchFamily="49" charset="0"/>
-              </a:rPr>
-              <a:t>  int currentNum = </a:t>
-            </a:r>
-            <a:r>
-              <a:rPr lang="en-US" sz="2799" b="1" noProof="1">
-                <a:latin typeface="Consolas" pitchFamily="49" charset="0"/>
-                <a:cs typeface="Consolas" pitchFamily="49" charset="0"/>
-              </a:rPr>
-              <a:t>int.Parse(</a:t>
-            </a:r>
-            <a:r>
-              <a:rPr lang="pt-BR" sz="2799" b="1" noProof="1">
-                <a:latin typeface="Consolas" pitchFamily="49" charset="0"/>
-                <a:cs typeface="Consolas" pitchFamily="49" charset="0"/>
-              </a:rPr>
-              <a:t>Console.ReadLine());</a:t>
-            </a:r>
-          </a:p>
-          <a:p>
-            <a:pPr eaLnBrk="0" hangingPunct="0">
-              <a:buClr>
-                <a:schemeClr val="accent5">
-                  <a:lumMod val="40000"/>
-                  <a:lumOff val="60000"/>
-                </a:schemeClr>
-              </a:buClr>
-              <a:buSzPct val="70000"/>
-            </a:pPr>
-            <a:r>
-              <a:rPr lang="pt-BR" sz="2799" b="1" noProof="1">
-                <a:latin typeface="Consolas" pitchFamily="49" charset="0"/>
-                <a:cs typeface="Consolas" pitchFamily="49" charset="0"/>
-              </a:rPr>
-              <a:t>  sum += currentNum;</a:t>
-            </a:r>
-          </a:p>
-          <a:p>
-            <a:pPr eaLnBrk="0" hangingPunct="0">
-              <a:buClr>
-                <a:schemeClr val="accent5">
-                  <a:lumMod val="40000"/>
-                  <a:lumOff val="60000"/>
-                </a:schemeClr>
-              </a:buClr>
-              <a:buSzPct val="70000"/>
-            </a:pPr>
-            <a:r>
-              <a:rPr lang="pt-BR" sz="2799" b="1" noProof="1">
-                <a:solidFill>
-                  <a:schemeClr val="bg1"/>
-                </a:solidFill>
-                <a:latin typeface="Consolas" pitchFamily="49" charset="0"/>
-                <a:cs typeface="Consolas" pitchFamily="49" charset="0"/>
-              </a:rPr>
-              <a:t>}</a:t>
-            </a:r>
-          </a:p>
-          <a:p>
-            <a:pPr eaLnBrk="0" hangingPunct="0">
-              <a:buClr>
-                <a:schemeClr val="accent5">
-                  <a:lumMod val="40000"/>
-                  <a:lumOff val="60000"/>
-                </a:schemeClr>
-              </a:buClr>
-              <a:buSzPct val="70000"/>
-            </a:pPr>
-            <a:r>
-              <a:rPr lang="pt-BR" sz="2799" b="1" noProof="1">
-                <a:latin typeface="Consolas" pitchFamily="49" charset="0"/>
-                <a:cs typeface="Consolas" pitchFamily="49" charset="0"/>
-              </a:rPr>
-              <a:t>Console.WriteLine(sum);</a:t>
-            </a:r>
-          </a:p>
-        </p:txBody>
-      </p:sp>
-      <p:sp>
-        <p:nvSpPr>
-          <p:cNvPr id="10" name="Rectangle 6">
-            <a:extLst>
-              <a:ext uri="{FF2B5EF4-FFF2-40B4-BE49-F238E27FC236}">
-                <a16:creationId xmlns:a16="http://schemas.microsoft.com/office/drawing/2014/main" id="{A07BEFD0-6F25-4C28-8185-2B46D44725CB}"/>
-              </a:ext>
-            </a:extLst>
-          </p:cNvPr>
-          <p:cNvSpPr/>
-          <p:nvPr/>
-        </p:nvSpPr>
-        <p:spPr>
-          <a:xfrm>
-            <a:off x="507351" y="6237313"/>
-            <a:ext cx="11177301" cy="430775"/>
-          </a:xfrm>
-          <a:prstGeom prst="rect">
-            <a:avLst/>
-          </a:prstGeom>
-        </p:spPr>
-        <p:txBody>
-          <a:bodyPr wrap="square">
-            <a:spAutoFit/>
-          </a:bodyPr>
-          <a:lstStyle>
-            <a:defPPr>
-              <a:defRPr lang="en-US"/>
-            </a:defPPr>
-            <a:lvl1pPr marL="0" algn="l" defTabSz="914400" rtl="0" eaLnBrk="1" latinLnBrk="0" hangingPunct="1">
-              <a:defRPr sz="1800" kern="1200">
-                <a:solidFill>
-                  <a:schemeClr val="tx1"/>
-                </a:solidFill>
-                <a:latin typeface="+mn-lt"/>
-                <a:ea typeface="+mn-ea"/>
-                <a:cs typeface="+mn-cs"/>
-              </a:defRPr>
-            </a:lvl1pPr>
-            <a:lvl2pPr marL="457200" algn="l" defTabSz="914400" rtl="0" eaLnBrk="1" latinLnBrk="0" hangingPunct="1">
-              <a:defRPr sz="1800" kern="1200">
-                <a:solidFill>
-                  <a:schemeClr val="tx1"/>
-                </a:solidFill>
-                <a:latin typeface="+mn-lt"/>
-                <a:ea typeface="+mn-ea"/>
-                <a:cs typeface="+mn-cs"/>
-              </a:defRPr>
-            </a:lvl2pPr>
-            <a:lvl3pPr marL="914400" algn="l" defTabSz="914400" rtl="0" eaLnBrk="1" latinLnBrk="0" hangingPunct="1">
-              <a:defRPr sz="1800" kern="1200">
-                <a:solidFill>
-                  <a:schemeClr val="tx1"/>
-                </a:solidFill>
-                <a:latin typeface="+mn-lt"/>
-                <a:ea typeface="+mn-ea"/>
-                <a:cs typeface="+mn-cs"/>
-              </a:defRPr>
-            </a:lvl3pPr>
-            <a:lvl4pPr marL="1371600" algn="l" defTabSz="914400" rtl="0" eaLnBrk="1" latinLnBrk="0" hangingPunct="1">
-              <a:defRPr sz="1800" kern="1200">
-                <a:solidFill>
-                  <a:schemeClr val="tx1"/>
-                </a:solidFill>
-                <a:latin typeface="+mn-lt"/>
-                <a:ea typeface="+mn-ea"/>
-                <a:cs typeface="+mn-cs"/>
-              </a:defRPr>
-            </a:lvl4pPr>
-            <a:lvl5pPr marL="1828800" algn="l" defTabSz="914400" rtl="0" eaLnBrk="1" latinLnBrk="0" hangingPunct="1">
-              <a:defRPr sz="1800" kern="1200">
-                <a:solidFill>
-                  <a:schemeClr val="tx1"/>
-                </a:solidFill>
-                <a:latin typeface="+mn-lt"/>
-                <a:ea typeface="+mn-ea"/>
-                <a:cs typeface="+mn-cs"/>
-              </a:defRPr>
-            </a:lvl5pPr>
-            <a:lvl6pPr marL="2286000" algn="l" defTabSz="914400" rtl="0" eaLnBrk="1" latinLnBrk="0" hangingPunct="1">
-              <a:defRPr sz="1800" kern="1200">
-                <a:solidFill>
-                  <a:schemeClr val="tx1"/>
-                </a:solidFill>
-                <a:latin typeface="+mn-lt"/>
-                <a:ea typeface="+mn-ea"/>
-                <a:cs typeface="+mn-cs"/>
-              </a:defRPr>
-            </a:lvl6pPr>
-            <a:lvl7pPr marL="2743200" algn="l" defTabSz="914400" rtl="0" eaLnBrk="1" latinLnBrk="0" hangingPunct="1">
-              <a:defRPr sz="1800" kern="1200">
-                <a:solidFill>
-                  <a:schemeClr val="tx1"/>
-                </a:solidFill>
-                <a:latin typeface="+mn-lt"/>
-                <a:ea typeface="+mn-ea"/>
-                <a:cs typeface="+mn-cs"/>
-              </a:defRPr>
-            </a:lvl7pPr>
-            <a:lvl8pPr marL="3200400" algn="l" defTabSz="914400" rtl="0" eaLnBrk="1" latinLnBrk="0" hangingPunct="1">
-              <a:defRPr sz="1800" kern="1200">
-                <a:solidFill>
-                  <a:schemeClr val="tx1"/>
-                </a:solidFill>
-                <a:latin typeface="+mn-lt"/>
-                <a:ea typeface="+mn-ea"/>
-                <a:cs typeface="+mn-cs"/>
-              </a:defRPr>
-            </a:lvl8pPr>
-            <a:lvl9pPr marL="3657600" algn="l" defTabSz="914400" rtl="0" eaLnBrk="1" latinLnBrk="0" hangingPunct="1">
-              <a:defRPr sz="1800" kern="1200">
-                <a:solidFill>
-                  <a:schemeClr val="tx1"/>
-                </a:solidFill>
-                <a:latin typeface="+mn-lt"/>
-                <a:ea typeface="+mn-ea"/>
-                <a:cs typeface="+mn-cs"/>
-              </a:defRPr>
-            </a:lvl9pPr>
-          </a:lstStyle>
-          <a:p>
-            <a:pPr algn="ctr"/>
-            <a:r>
-              <a:rPr lang="bg-BG" sz="2199" dirty="0"/>
-              <a:t>Тествайте</a:t>
-            </a:r>
-            <a:r>
-              <a:rPr lang="bg-BG" sz="2199" dirty="0">
-                <a:solidFill>
-                  <a:prstClr val="white"/>
-                </a:solidFill>
-              </a:rPr>
-              <a:t> </a:t>
-            </a:r>
-            <a:r>
-              <a:rPr lang="bg-BG" sz="2199" dirty="0"/>
-              <a:t>решението си в </a:t>
-            </a:r>
-            <a:r>
-              <a:rPr lang="en-US" sz="2199" dirty="0"/>
-              <a:t>Judge: </a:t>
-            </a:r>
-            <a:r>
-              <a:rPr lang="en-US" sz="2199" dirty="0">
-                <a:hlinkClick r:id="rId2"/>
-              </a:rPr>
-              <a:t>https://judge.softuni.bg/Contests/Practice/Index/3157#13</a:t>
-            </a:r>
-            <a:endParaRPr lang="en-US" sz="2199" dirty="0">
-              <a:solidFill>
-                <a:prstClr val="white"/>
-              </a:solidFill>
-            </a:endParaRPr>
-          </a:p>
-        </p:txBody>
-      </p:sp>
-      <p:sp>
-        <p:nvSpPr>
-          <p:cNvPr id="8" name="Slide Number">
-            <a:extLst>
-              <a:ext uri="{FF2B5EF4-FFF2-40B4-BE49-F238E27FC236}">
-                <a16:creationId xmlns:a16="http://schemas.microsoft.com/office/drawing/2014/main" id="{393C1E8E-643B-49AB-9A05-53654DED6B54}"/>
-              </a:ext>
-            </a:extLst>
-          </p:cNvPr>
-          <p:cNvSpPr>
-            <a:spLocks noGrp="1"/>
-          </p:cNvSpPr>
-          <p:nvPr>
-            <p:ph type="sldNum" sz="quarter" idx="5"/>
-          </p:nvPr>
-        </p:nvSpPr>
-        <p:spPr>
-          <a:xfrm>
-            <a:off x="11753030" y="6507000"/>
-            <a:ext cx="367414" cy="297000"/>
-          </a:xfrm>
-          <a:prstGeom prst="rect">
-            <a:avLst/>
-          </a:prstGeom>
-        </p:spPr>
-        <p:txBody>
-          <a:bodyPr vert="horz" lIns="91440" tIns="45720" rIns="91440" bIns="45720" rtlCol="0" anchor="b"/>
-          <a:lstStyle>
-            <a:lvl1pPr algn="r">
-              <a:defRPr sz="1000"/>
-            </a:lvl1pPr>
-          </a:lstStyle>
-          <a:p>
-            <a:fld id="{2BF067CD-8E6B-4360-9AA8-C5DF2A48A6D1}" type="slidenum">
-              <a:rPr lang="en-US" noProof="0" smtClean="0"/>
-              <a:pPr/>
-              <a:t>28</a:t>
-            </a:fld>
-            <a:endParaRPr lang="en-US" noProof="0" dirty="0"/>
-          </a:p>
-        </p:txBody>
-      </p:sp>
-    </p:spTree>
-    <p:extLst>
-      <p:ext uri="{BB962C8B-B14F-4D97-AF65-F5344CB8AC3E}">
-        <p14:creationId xmlns:p14="http://schemas.microsoft.com/office/powerpoint/2010/main" val="473243704"/>
-      </p:ext>
-    </p:extLst>
-  </p:cSld>
-  <p:clrMapOvr>
-    <a:masterClrMapping/>
-  </p:clrMapOvr>
-  <mc:AlternateContent xmlns:mc="http://schemas.openxmlformats.org/markup-compatibility/2006" xmlns:p14="http://schemas.microsoft.com/office/powerpoint/2010/main">
-    <mc:Choice Requires="p14">
-      <p:transition p14:dur="0" advClick="0" advTm="5000"/>
-    </mc:Choice>
-    <mc:Fallback xmlns="">
-      <p:transition advClick="0" advTm="5000"/>
-    </mc:Fallback>
-  </mc:AlternateContent>
-  <p:timing>
-    <p:tnLst>
-      <p:par>
-        <p:cTn id="1" dur="indefinite" restart="never" nodeType="tmRoot">
-          <p:childTnLst>
-            <p:seq concurrent="1" nextAc="seek">
-              <p:cTn id="2" dur="indefinite" nodeType="mainSeq">
-                <p:childTnLst>
-                  <p:par>
-                    <p:cTn id="3" fill="hold">
-                      <p:stCondLst>
-                        <p:cond delay="indefinite"/>
-                      </p:stCondLst>
-                      <p:childTnLst>
-                        <p:par>
-                          <p:cTn id="4" fill="hold">
-                            <p:stCondLst>
-                              <p:cond delay="0"/>
-                            </p:stCondLst>
-                            <p:childTnLst>
-                              <p:par>
-                                <p:cTn id="5" presetID="1" presetClass="entr" presetSubtype="0" fill="hold" nodeType="clickEffect">
-                                  <p:stCondLst>
-                                    <p:cond delay="0"/>
-                                  </p:stCondLst>
-                                  <p:childTnLst>
-                                    <p:set>
-                                      <p:cBhvr>
-                                        <p:cTn id="6" dur="1" fill="hold">
-                                          <p:stCondLst>
-                                            <p:cond delay="0"/>
-                                          </p:stCondLst>
-                                        </p:cTn>
-                                        <p:tgtEl>
-                                          <p:spTgt spid="7">
-                                            <p:txEl>
-                                              <p:pRg st="3" end="3"/>
-                                            </p:txEl>
-                                          </p:spTgt>
-                                        </p:tgtEl>
-                                        <p:attrNameLst>
-                                          <p:attrName>style.visibility</p:attrName>
-                                        </p:attrNameLst>
-                                      </p:cBhvr>
-                                      <p:to>
-                                        <p:strVal val="visible"/>
-                                      </p:to>
-                                    </p:set>
-                                  </p:childTnLst>
-                                </p:cTn>
-                              </p:par>
-                              <p:par>
-                                <p:cTn id="7" presetID="1" presetClass="entr" presetSubtype="0" fill="hold" nodeType="withEffect">
-                                  <p:stCondLst>
-                                    <p:cond delay="0"/>
-                                  </p:stCondLst>
-                                  <p:childTnLst>
-                                    <p:set>
-                                      <p:cBhvr>
-                                        <p:cTn id="8" dur="1" fill="hold">
-                                          <p:stCondLst>
-                                            <p:cond delay="0"/>
-                                          </p:stCondLst>
-                                        </p:cTn>
-                                        <p:tgtEl>
-                                          <p:spTgt spid="7">
-                                            <p:txEl>
-                                              <p:pRg st="4" end="4"/>
-                                            </p:txEl>
-                                          </p:spTgt>
-                                        </p:tgtEl>
-                                        <p:attrNameLst>
-                                          <p:attrName>style.visibility</p:attrName>
-                                        </p:attrNameLst>
-                                      </p:cBhvr>
-                                      <p:to>
-                                        <p:strVal val="visible"/>
-                                      </p:to>
-                                    </p:set>
-                                  </p:childTnLst>
-                                </p:cTn>
-                              </p:par>
-                              <p:par>
-                                <p:cTn id="9" presetID="1" presetClass="entr" presetSubtype="0" fill="hold" nodeType="withEffect">
-                                  <p:stCondLst>
-                                    <p:cond delay="0"/>
-                                  </p:stCondLst>
-                                  <p:childTnLst>
-                                    <p:set>
-                                      <p:cBhvr>
-                                        <p:cTn id="10" dur="1" fill="hold">
-                                          <p:stCondLst>
-                                            <p:cond delay="0"/>
-                                          </p:stCondLst>
-                                        </p:cTn>
-                                        <p:tgtEl>
-                                          <p:spTgt spid="7">
-                                            <p:txEl>
-                                              <p:pRg st="7" end="7"/>
-                                            </p:txEl>
-                                          </p:spTgt>
-                                        </p:tgtEl>
-                                        <p:attrNameLst>
-                                          <p:attrName>style.visibility</p:attrName>
-                                        </p:attrNameLst>
-                                      </p:cBhvr>
-                                      <p:to>
-                                        <p:strVal val="visible"/>
-                                      </p:to>
-                                    </p:set>
-                                  </p:childTnLst>
-                                </p:cTn>
-                              </p:par>
-                            </p:childTnLst>
-                          </p:cTn>
-                        </p:par>
-                      </p:childTnLst>
-                    </p:cTn>
-                  </p:par>
-                  <p:par>
-                    <p:cTn id="11" fill="hold">
-                      <p:stCondLst>
-                        <p:cond delay="indefinite"/>
-                      </p:stCondLst>
-                      <p:childTnLst>
-                        <p:par>
-                          <p:cTn id="12" fill="hold">
-                            <p:stCondLst>
-                              <p:cond delay="0"/>
-                            </p:stCondLst>
-                            <p:childTnLst>
-                              <p:par>
-                                <p:cTn id="13" presetID="1" presetClass="entr" presetSubtype="0" fill="hold" nodeType="clickEffect">
-                                  <p:stCondLst>
-                                    <p:cond delay="0"/>
-                                  </p:stCondLst>
-                                  <p:childTnLst>
-                                    <p:set>
-                                      <p:cBhvr>
-                                        <p:cTn id="14" dur="1" fill="hold">
-                                          <p:stCondLst>
-                                            <p:cond delay="0"/>
-                                          </p:stCondLst>
-                                        </p:cTn>
-                                        <p:tgtEl>
-                                          <p:spTgt spid="7">
-                                            <p:txEl>
-                                              <p:pRg st="5" end="5"/>
-                                            </p:txEl>
-                                          </p:spTgt>
-                                        </p:tgtEl>
-                                        <p:attrNameLst>
-                                          <p:attrName>style.visibility</p:attrName>
-                                        </p:attrNameLst>
-                                      </p:cBhvr>
-                                      <p:to>
-                                        <p:strVal val="visible"/>
-                                      </p:to>
-                                    </p:set>
-                                  </p:childTnLst>
-                                </p:cTn>
-                              </p:par>
-                              <p:par>
-                                <p:cTn id="15" presetID="1" presetClass="entr" presetSubtype="0" fill="hold" nodeType="withEffect">
-                                  <p:stCondLst>
-                                    <p:cond delay="0"/>
-                                  </p:stCondLst>
-                                  <p:childTnLst>
-                                    <p:set>
-                                      <p:cBhvr>
-                                        <p:cTn id="16" dur="1" fill="hold">
-                                          <p:stCondLst>
-                                            <p:cond delay="0"/>
-                                          </p:stCondLst>
-                                        </p:cTn>
-                                        <p:tgtEl>
-                                          <p:spTgt spid="7">
-                                            <p:txEl>
-                                              <p:pRg st="6" end="6"/>
-                                            </p:txEl>
-                                          </p:spTgt>
-                                        </p:tgtEl>
-                                        <p:attrNameLst>
-                                          <p:attrName>style.visibility</p:attrName>
-                                        </p:attrNameLst>
-                                      </p:cBhvr>
-                                      <p:to>
-                                        <p:strVal val="visible"/>
-                                      </p:to>
-                                    </p:set>
-                                  </p:childTnLst>
-                                </p:cTn>
-                              </p:par>
-                            </p:childTnLst>
-                          </p:cTn>
-                        </p:par>
-                      </p:childTnLst>
-                    </p:cTn>
-                  </p:par>
-                  <p:par>
-                    <p:cTn id="17" fill="hold">
-                      <p:stCondLst>
-                        <p:cond delay="indefinite"/>
-                      </p:stCondLst>
-                      <p:childTnLst>
-                        <p:par>
-                          <p:cTn id="18" fill="hold">
-                            <p:stCondLst>
-                              <p:cond delay="0"/>
-                            </p:stCondLst>
-                            <p:childTnLst>
-                              <p:par>
-                                <p:cTn id="19" presetID="1" presetClass="entr" presetSubtype="0" fill="hold" nodeType="clickEffect">
-                                  <p:stCondLst>
-                                    <p:cond delay="0"/>
-                                  </p:stCondLst>
-                                  <p:childTnLst>
-                                    <p:set>
-                                      <p:cBhvr>
-                                        <p:cTn id="20" dur="1" fill="hold">
-                                          <p:stCondLst>
-                                            <p:cond delay="0"/>
-                                          </p:stCondLst>
-                                        </p:cTn>
-                                        <p:tgtEl>
-                                          <p:spTgt spid="7">
-                                            <p:txEl>
-                                              <p:pRg st="8" end="8"/>
-                                            </p:txEl>
-                                          </p:spTgt>
-                                        </p:tgtEl>
-                                        <p:attrNameLst>
-                                          <p:attrName>style.visibility</p:attrName>
-                                        </p:attrNameLst>
-                                      </p:cBhvr>
-                                      <p:to>
-                                        <p:strVal val="visible"/>
-                                      </p:to>
-                                    </p:set>
-                                  </p:childTnLst>
-                                </p:cTn>
-                              </p:par>
-                            </p:childTnLst>
-                          </p:cTn>
-                        </p:par>
-                      </p:childTnLst>
-                    </p:cTn>
-                  </p:par>
-                </p:childTnLst>
-              </p:cTn>
-              <p:prevCondLst>
-                <p:cond evt="onPrev" delay="0">
-                  <p:tgtEl>
-                    <p:sldTgt/>
-                  </p:tgtEl>
-                </p:cond>
-              </p:prevCondLst>
-              <p:nextCondLst>
-                <p:cond evt="onNext" delay="0">
-                  <p:tgtEl>
-                    <p:sldTgt/>
-                  </p:tgtEl>
-                </p:cond>
-              </p:nextCondLst>
-            </p:seq>
-          </p:childTnLst>
-        </p:cTn>
-      </p:par>
-    </p:tnLst>
-  </p:timing>
-</p:sld>
-</file>
-
-<file path=ppt/slides/slide29.xml><?xml version="1.0" encoding="utf-8"?>
-<p:sld xmlns:a="http://schemas.openxmlformats.org/drawingml/2006/main" xmlns:r="http://schemas.openxmlformats.org/officeDocument/2006/relationships" xmlns:p="http://schemas.openxmlformats.org/presentationml/2006/main">
-  <p:cSld>
-    <p:spTree>
-      <p:nvGrpSpPr>
-        <p:cNvPr id="1" name=""/>
-        <p:cNvGrpSpPr/>
-        <p:nvPr/>
-      </p:nvGrpSpPr>
-      <p:grpSpPr>
-        <a:xfrm>
-          <a:off x="0" y="0"/>
-          <a:ext cx="0" cy="0"/>
-          <a:chOff x="0" y="0"/>
-          <a:chExt cx="0" cy="0"/>
-        </a:xfrm>
-      </p:grpSpPr>
       <p:grpSp>
         <p:nvGrpSpPr>
           <p:cNvPr id="12" name="Group 11">
@@ -25968,125 +24231,7 @@
 </p:sld>
 </file>
 
-<file path=ppt/slides/slide3.xml><?xml version="1.0" encoding="utf-8"?>
-<p:sld xmlns:a="http://schemas.openxmlformats.org/drawingml/2006/main" xmlns:r="http://schemas.openxmlformats.org/officeDocument/2006/relationships" xmlns:p="http://schemas.openxmlformats.org/presentationml/2006/main">
-  <p:cSld>
-    <p:spTree>
-      <p:nvGrpSpPr>
-        <p:cNvPr id="1" name=""/>
-        <p:cNvGrpSpPr/>
-        <p:nvPr/>
-      </p:nvGrpSpPr>
-      <p:grpSpPr>
-        <a:xfrm>
-          <a:off x="0" y="0"/>
-          <a:ext cx="0" cy="0"/>
-          <a:chOff x="0" y="0"/>
-          <a:chExt cx="0" cy="0"/>
-        </a:xfrm>
-      </p:grpSpPr>
-      <p:sp>
-        <p:nvSpPr>
-          <p:cNvPr id="2" name="Title 1">
-            <a:extLst>
-              <a:ext uri="{FF2B5EF4-FFF2-40B4-BE49-F238E27FC236}">
-                <a16:creationId xmlns:a16="http://schemas.microsoft.com/office/drawing/2014/main" id="{C9D1D713-4956-4FC0-AB9F-FE828A5B8ABA}"/>
-              </a:ext>
-            </a:extLst>
-          </p:cNvPr>
-          <p:cNvSpPr>
-            <a:spLocks noGrp="1"/>
-          </p:cNvSpPr>
-          <p:nvPr>
-            <p:ph type="title" sz="quarter" idx="10"/>
-          </p:nvPr>
-        </p:nvSpPr>
-        <p:spPr/>
-        <p:txBody>
-          <a:bodyPr/>
-          <a:lstStyle/>
-          <a:p>
-            <a:r>
-              <a:rPr lang="bg-BG"/>
-              <a:t>Конструкция за </a:t>
-            </a:r>
-            <a:r>
-              <a:rPr lang="en-GB"/>
-              <a:t>For-</a:t>
-            </a:r>
-            <a:r>
-              <a:rPr lang="bg-BG"/>
-              <a:t>цикъл</a:t>
-            </a:r>
-            <a:endParaRPr lang="bg-BG" dirty="0"/>
-          </a:p>
-        </p:txBody>
-      </p:sp>
-      <p:pic>
-        <p:nvPicPr>
-          <p:cNvPr id="11" name="Picture 10">
-            <a:extLst>
-              <a:ext uri="{FF2B5EF4-FFF2-40B4-BE49-F238E27FC236}">
-                <a16:creationId xmlns:a16="http://schemas.microsoft.com/office/drawing/2014/main" id="{E94D2624-E2FA-4C5C-9D78-49388F45B3F6}"/>
-              </a:ext>
-            </a:extLst>
-          </p:cNvPr>
-          <p:cNvPicPr>
-            <a:picLocks noChangeAspect="1"/>
-          </p:cNvPicPr>
-          <p:nvPr/>
-        </p:nvPicPr>
-        <p:blipFill>
-          <a:blip r:embed="rId3" cstate="print">
-            <a:duotone>
-              <a:schemeClr val="accent5">
-                <a:shade val="45000"/>
-                <a:satMod val="135000"/>
-              </a:schemeClr>
-              <a:prstClr val="white"/>
-            </a:duotone>
-            <a:extLst>
-              <a:ext uri="{28A0092B-C50C-407E-A947-70E740481C1C}">
-                <a14:useLocalDpi xmlns:a14="http://schemas.microsoft.com/office/drawing/2010/main" val="0"/>
-              </a:ext>
-            </a:extLst>
-          </a:blip>
-          <a:stretch>
-            <a:fillRect/>
-          </a:stretch>
-        </p:blipFill>
-        <p:spPr>
-          <a:xfrm>
-            <a:off x="4714866" y="1524499"/>
-            <a:ext cx="2762271" cy="2294825"/>
-          </a:xfrm>
-          <a:prstGeom prst="rect">
-            <a:avLst/>
-          </a:prstGeom>
-        </p:spPr>
-      </p:pic>
-    </p:spTree>
-    <p:extLst>
-      <p:ext uri="{BB962C8B-B14F-4D97-AF65-F5344CB8AC3E}">
-        <p14:creationId xmlns:p14="http://schemas.microsoft.com/office/powerpoint/2010/main" val="905453525"/>
-      </p:ext>
-    </p:extLst>
-  </p:cSld>
-  <p:clrMapOvr>
-    <a:masterClrMapping/>
-  </p:clrMapOvr>
-  <mc:AlternateContent xmlns:mc="http://schemas.openxmlformats.org/markup-compatibility/2006" xmlns:p14="http://schemas.microsoft.com/office/powerpoint/2010/main">
-    <mc:Choice Requires="p14">
-      <p:transition p14:dur="0" advClick="0" advTm="5000"/>
-    </mc:Choice>
-    <mc:Fallback xmlns="">
-      <p:transition advClick="0" advTm="5000"/>
-    </mc:Fallback>
-  </mc:AlternateContent>
-</p:sld>
-</file>
-
-<file path=ppt/slides/slide30.xml><?xml version="1.0" encoding="utf-8"?>
+<file path=ppt/slides/slide28.xml><?xml version="1.0" encoding="utf-8"?>
 <p:sld xmlns:a="http://schemas.openxmlformats.org/drawingml/2006/main" xmlns:r="http://schemas.openxmlformats.org/officeDocument/2006/relationships" xmlns:p="http://schemas.openxmlformats.org/presentationml/2006/main">
   <p:cSld>
     <p:spTree>
@@ -29590,7 +27735,7 @@
             <a:fld id="{2BF067CD-8E6B-4360-9AA8-C5DF2A48A6D1}" type="slidenum">
               <a:rPr lang="en-US" noProof="0" smtClean="0"/>
               <a:pPr/>
-              <a:t>30</a:t>
+              <a:t>28</a:t>
             </a:fld>
             <a:endParaRPr lang="en-US" noProof="0" dirty="0"/>
           </a:p>
@@ -30362,7 +28507,7 @@
 </p:sld>
 </file>
 
-<file path=ppt/slides/slide31.xml><?xml version="1.0" encoding="utf-8"?>
+<file path=ppt/slides/slide29.xml><?xml version="1.0" encoding="utf-8"?>
 <p:sld xmlns:a="http://schemas.openxmlformats.org/drawingml/2006/main" xmlns:r="http://schemas.openxmlformats.org/officeDocument/2006/relationships" xmlns:p="http://schemas.openxmlformats.org/presentationml/2006/main">
   <p:cSld>
     <p:spTree>
@@ -30723,7 +28868,7 @@
             <a:fld id="{2BF067CD-8E6B-4360-9AA8-C5DF2A48A6D1}" type="slidenum">
               <a:rPr lang="en-US" smtClean="0"/>
               <a:pPr/>
-              <a:t>31</a:t>
+              <a:t>29</a:t>
             </a:fld>
             <a:endParaRPr lang="en-US" dirty="0"/>
           </a:p>
@@ -31738,7 +29883,125 @@
 </p:sld>
 </file>
 
-<file path=ppt/slides/slide32.xml><?xml version="1.0" encoding="utf-8"?>
+<file path=ppt/slides/slide3.xml><?xml version="1.0" encoding="utf-8"?>
+<p:sld xmlns:a="http://schemas.openxmlformats.org/drawingml/2006/main" xmlns:r="http://schemas.openxmlformats.org/officeDocument/2006/relationships" xmlns:p="http://schemas.openxmlformats.org/presentationml/2006/main">
+  <p:cSld>
+    <p:spTree>
+      <p:nvGrpSpPr>
+        <p:cNvPr id="1" name=""/>
+        <p:cNvGrpSpPr/>
+        <p:nvPr/>
+      </p:nvGrpSpPr>
+      <p:grpSpPr>
+        <a:xfrm>
+          <a:off x="0" y="0"/>
+          <a:ext cx="0" cy="0"/>
+          <a:chOff x="0" y="0"/>
+          <a:chExt cx="0" cy="0"/>
+        </a:xfrm>
+      </p:grpSpPr>
+      <p:sp>
+        <p:nvSpPr>
+          <p:cNvPr id="2" name="Title 1">
+            <a:extLst>
+              <a:ext uri="{FF2B5EF4-FFF2-40B4-BE49-F238E27FC236}">
+                <a16:creationId xmlns:a16="http://schemas.microsoft.com/office/drawing/2014/main" id="{C9D1D713-4956-4FC0-AB9F-FE828A5B8ABA}"/>
+              </a:ext>
+            </a:extLst>
+          </p:cNvPr>
+          <p:cNvSpPr>
+            <a:spLocks noGrp="1"/>
+          </p:cNvSpPr>
+          <p:nvPr>
+            <p:ph type="title" sz="quarter" idx="10"/>
+          </p:nvPr>
+        </p:nvSpPr>
+        <p:spPr/>
+        <p:txBody>
+          <a:bodyPr/>
+          <a:lstStyle/>
+          <a:p>
+            <a:r>
+              <a:rPr lang="bg-BG"/>
+              <a:t>Конструкция за </a:t>
+            </a:r>
+            <a:r>
+              <a:rPr lang="en-GB"/>
+              <a:t>For-</a:t>
+            </a:r>
+            <a:r>
+              <a:rPr lang="bg-BG"/>
+              <a:t>цикъл</a:t>
+            </a:r>
+            <a:endParaRPr lang="bg-BG" dirty="0"/>
+          </a:p>
+        </p:txBody>
+      </p:sp>
+      <p:pic>
+        <p:nvPicPr>
+          <p:cNvPr id="11" name="Picture 10">
+            <a:extLst>
+              <a:ext uri="{FF2B5EF4-FFF2-40B4-BE49-F238E27FC236}">
+                <a16:creationId xmlns:a16="http://schemas.microsoft.com/office/drawing/2014/main" id="{E94D2624-E2FA-4C5C-9D78-49388F45B3F6}"/>
+              </a:ext>
+            </a:extLst>
+          </p:cNvPr>
+          <p:cNvPicPr>
+            <a:picLocks noChangeAspect="1"/>
+          </p:cNvPicPr>
+          <p:nvPr/>
+        </p:nvPicPr>
+        <p:blipFill>
+          <a:blip r:embed="rId3" cstate="print">
+            <a:duotone>
+              <a:schemeClr val="accent5">
+                <a:shade val="45000"/>
+                <a:satMod val="135000"/>
+              </a:schemeClr>
+              <a:prstClr val="white"/>
+            </a:duotone>
+            <a:extLst>
+              <a:ext uri="{28A0092B-C50C-407E-A947-70E740481C1C}">
+                <a14:useLocalDpi xmlns:a14="http://schemas.microsoft.com/office/drawing/2010/main" val="0"/>
+              </a:ext>
+            </a:extLst>
+          </a:blip>
+          <a:stretch>
+            <a:fillRect/>
+          </a:stretch>
+        </p:blipFill>
+        <p:spPr>
+          <a:xfrm>
+            <a:off x="4714866" y="1524499"/>
+            <a:ext cx="2762271" cy="2294825"/>
+          </a:xfrm>
+          <a:prstGeom prst="rect">
+            <a:avLst/>
+          </a:prstGeom>
+        </p:spPr>
+      </p:pic>
+    </p:spTree>
+    <p:extLst>
+      <p:ext uri="{BB962C8B-B14F-4D97-AF65-F5344CB8AC3E}">
+        <p14:creationId xmlns:p14="http://schemas.microsoft.com/office/powerpoint/2010/main" val="905453525"/>
+      </p:ext>
+    </p:extLst>
+  </p:cSld>
+  <p:clrMapOvr>
+    <a:masterClrMapping/>
+  </p:clrMapOvr>
+  <mc:AlternateContent xmlns:mc="http://schemas.openxmlformats.org/markup-compatibility/2006" xmlns:p14="http://schemas.microsoft.com/office/powerpoint/2010/main">
+    <mc:Choice Requires="p14">
+      <p:transition p14:dur="0" advClick="0" advTm="5000"/>
+    </mc:Choice>
+    <mc:Fallback xmlns="">
+      <p:transition advClick="0" advTm="5000"/>
+    </mc:Fallback>
+  </mc:AlternateContent>
+</p:sld>
+</file>
+
+<file path=ppt/slides/slide30.xml><?xml version="1.0" encoding="utf-8"?>
 <p:sld xmlns:a="http://schemas.openxmlformats.org/drawingml/2006/main" xmlns:r="http://schemas.openxmlformats.org/officeDocument/2006/relationships" xmlns:p="http://schemas.openxmlformats.org/presentationml/2006/main">
   <p:cSld>
     <p:spTree>
@@ -32370,7 +30633,7 @@
             <a:fld id="{2BF067CD-8E6B-4360-9AA8-C5DF2A48A6D1}" type="slidenum">
               <a:rPr lang="en-US" noProof="0" smtClean="0"/>
               <a:pPr/>
-              <a:t>32</a:t>
+              <a:t>30</a:t>
             </a:fld>
             <a:endParaRPr lang="en-US" noProof="0" dirty="0"/>
           </a:p>
@@ -32648,7 +30911,7 @@
 </p:sld>
 </file>
 
-<file path=ppt/slides/slide33.xml><?xml version="1.0" encoding="utf-8"?>
+<file path=ppt/slides/slide31.xml><?xml version="1.0" encoding="utf-8"?>
 <p:sld xmlns:a="http://schemas.openxmlformats.org/drawingml/2006/main" xmlns:r="http://schemas.openxmlformats.org/officeDocument/2006/relationships" xmlns:p="http://schemas.openxmlformats.org/presentationml/2006/main">
   <p:cSld>
     <p:spTree>
@@ -32892,7 +31155,7 @@
             <a:fld id="{2BF067CD-8E6B-4360-9AA8-C5DF2A48A6D1}" type="slidenum">
               <a:rPr lang="en-US" noProof="0" smtClean="0"/>
               <a:pPr/>
-              <a:t>33</a:t>
+              <a:t>31</a:t>
             </a:fld>
             <a:endParaRPr lang="en-US" noProof="0" dirty="0"/>
           </a:p>
@@ -33104,7 +31367,7 @@
 </p:sld>
 </file>
 
-<file path=ppt/slides/slide34.xml><?xml version="1.0" encoding="utf-8"?>
+<file path=ppt/slides/slide32.xml><?xml version="1.0" encoding="utf-8"?>
 <p:sld xmlns:a="http://schemas.openxmlformats.org/drawingml/2006/main" xmlns:r="http://schemas.openxmlformats.org/officeDocument/2006/relationships" xmlns:p="http://schemas.openxmlformats.org/presentationml/2006/main">
   <p:cSld>
     <p:spTree>
@@ -33552,7 +31815,7 @@
             <a:fld id="{2BF067CD-8E6B-4360-9AA8-C5DF2A48A6D1}" type="slidenum">
               <a:rPr lang="en-US" smtClean="0"/>
               <a:pPr/>
-              <a:t>34</a:t>
+              <a:t>32</a:t>
             </a:fld>
             <a:endParaRPr lang="en-US" dirty="0"/>
           </a:p>
@@ -33878,7 +32141,7 @@
 </p:sld>
 </file>
 
-<file path=ppt/slides/slide35.xml><?xml version="1.0" encoding="utf-8"?>
+<file path=ppt/slides/slide33.xml><?xml version="1.0" encoding="utf-8"?>
 <p:sld xmlns:a="http://schemas.openxmlformats.org/drawingml/2006/main" xmlns:r="http://schemas.openxmlformats.org/officeDocument/2006/relationships" xmlns:p="http://schemas.openxmlformats.org/presentationml/2006/main">
   <p:cSld>
     <p:spTree>
@@ -34600,7 +32863,7 @@
             <a:fld id="{2BF067CD-8E6B-4360-9AA8-C5DF2A48A6D1}" type="slidenum">
               <a:rPr lang="en-US" noProof="0" smtClean="0"/>
               <a:pPr/>
-              <a:t>35</a:t>
+              <a:t>33</a:t>
             </a:fld>
             <a:endParaRPr lang="en-US" noProof="0" dirty="0"/>
           </a:p>
@@ -34853,7 +33116,7 @@
 </p:sld>
 </file>
 
-<file path=ppt/slides/slide36.xml><?xml version="1.0" encoding="utf-8"?>
+<file path=ppt/slides/slide34.xml><?xml version="1.0" encoding="utf-8"?>
 <p:sld xmlns:a="http://schemas.openxmlformats.org/drawingml/2006/main" xmlns:r="http://schemas.openxmlformats.org/officeDocument/2006/relationships" xmlns:p="http://schemas.openxmlformats.org/presentationml/2006/main">
   <p:cSld>
     <p:spTree>
@@ -34932,7 +33195,7 @@
 </p:sld>
 </file>
 
-<file path=ppt/slides/slide37.xml><?xml version="1.0" encoding="utf-8"?>
+<file path=ppt/slides/slide35.xml><?xml version="1.0" encoding="utf-8"?>
 <p:sld xmlns:a="http://schemas.openxmlformats.org/drawingml/2006/main" xmlns:r="http://schemas.openxmlformats.org/officeDocument/2006/relationships" xmlns:p="http://schemas.openxmlformats.org/presentationml/2006/main">
   <p:cSld>
     <p:spTree>
@@ -35196,7 +33459,7 @@
             <a:fld id="{2BF067CD-8E6B-4360-9AA8-C5DF2A48A6D1}" type="slidenum">
               <a:rPr lang="en-US" noProof="0" smtClean="0"/>
               <a:pPr/>
-              <a:t>37</a:t>
+              <a:t>35</a:t>
             </a:fld>
             <a:endParaRPr lang="en-US" noProof="0" dirty="0"/>
           </a:p>
@@ -35223,7 +33486,7 @@
 </p:sld>
 </file>
 
-<file path=ppt/slides/slide38.xml><?xml version="1.0" encoding="utf-8"?>
+<file path=ppt/slides/slide36.xml><?xml version="1.0" encoding="utf-8"?>
 <p:sld xmlns:a="http://schemas.openxmlformats.org/drawingml/2006/main" xmlns:r="http://schemas.openxmlformats.org/officeDocument/2006/relationships" xmlns:p="http://schemas.openxmlformats.org/presentationml/2006/main">
   <p:cSld>
     <p:spTree>
@@ -35529,7 +33792,7 @@
             <a:fld id="{2BF067CD-8E6B-4360-9AA8-C5DF2A48A6D1}" type="slidenum">
               <a:rPr lang="en-US" smtClean="0"/>
               <a:pPr/>
-              <a:t>38</a:t>
+              <a:t>36</a:t>
             </a:fld>
             <a:endParaRPr lang="en-US" dirty="0"/>
           </a:p>

</xml_diff>